<commit_message>
finish powerpoint and talk about multithread in paper
</commit_message>
<xml_diff>
--- a/paper/presentation.pptx
+++ b/paper/presentation.pptx
@@ -11,6 +11,13 @@
     <p:sldId id="259" r:id="rId5"/>
     <p:sldId id="260" r:id="rId6"/>
     <p:sldId id="261" r:id="rId7"/>
+    <p:sldId id="262" r:id="rId8"/>
+    <p:sldId id="263" r:id="rId9"/>
+    <p:sldId id="264" r:id="rId10"/>
+    <p:sldId id="266" r:id="rId11"/>
+    <p:sldId id="267" r:id="rId12"/>
+    <p:sldId id="268" r:id="rId13"/>
+    <p:sldId id="269" r:id="rId14"/>
   </p:sldIdLst>
   <p:sldSz cx="12192000" cy="6858000"/>
   <p:notesSz cx="6858000" cy="9144000"/>
@@ -109,6 +116,11 @@
       </a:defRPr>
     </a:lvl9pPr>
   </p:defaultTextStyle>
+  <p:extLst>
+    <p:ext uri="{EFAFB233-063F-42B5-8137-9DF3F51BA10A}">
+      <p15:sldGuideLst xmlns:p15="http://schemas.microsoft.com/office/powerpoint/2012/main"/>
+    </p:ext>
+  </p:extLst>
 </p:presentation>
 </file>
 
@@ -6199,6 +6211,985 @@
 </p:sld>
 </file>
 
+<file path=ppt/slides/slide10.xml><?xml version="1.0" encoding="utf-8"?>
+<p:sld xmlns:a="http://schemas.openxmlformats.org/drawingml/2006/main" xmlns:r="http://schemas.openxmlformats.org/officeDocument/2006/relationships" xmlns:p="http://schemas.openxmlformats.org/presentationml/2006/main">
+  <p:cSld>
+    <p:spTree>
+      <p:nvGrpSpPr>
+        <p:cNvPr id="1" name=""/>
+        <p:cNvGrpSpPr/>
+        <p:nvPr/>
+      </p:nvGrpSpPr>
+      <p:grpSpPr>
+        <a:xfrm>
+          <a:off x="0" y="0"/>
+          <a:ext cx="0" cy="0"/>
+          <a:chOff x="0" y="0"/>
+          <a:chExt cx="0" cy="0"/>
+        </a:xfrm>
+      </p:grpSpPr>
+      <p:sp>
+        <p:nvSpPr>
+          <p:cNvPr id="2" name="Title 1"/>
+          <p:cNvSpPr>
+            <a:spLocks noGrp="1"/>
+          </p:cNvSpPr>
+          <p:nvPr>
+            <p:ph type="title"/>
+          </p:nvPr>
+        </p:nvSpPr>
+        <p:spPr/>
+        <p:txBody>
+          <a:bodyPr/>
+          <a:lstStyle/>
+          <a:p>
+            <a:r>
+              <a:rPr lang="en-CA" dirty="0" smtClean="0"/>
+              <a:t>Results (</a:t>
+            </a:r>
+            <a:r>
+              <a:rPr lang="en-CA" dirty="0" err="1" smtClean="0"/>
+              <a:t>s</a:t>
+            </a:r>
+            <a:r>
+              <a:rPr lang="en-CA" dirty="0" err="1" smtClean="0">
+                <a:sym typeface="Wingdings" panose="05000000000000000000" pitchFamily="2" charset="2"/>
+              </a:rPr>
+              <a:t>samples</a:t>
+            </a:r>
+            <a:r>
+              <a:rPr lang="en-CA" dirty="0" smtClean="0">
+                <a:sym typeface="Wingdings" panose="05000000000000000000" pitchFamily="2" charset="2"/>
+              </a:rPr>
+              <a:t>, </a:t>
+            </a:r>
+            <a:r>
+              <a:rPr lang="en-CA" dirty="0" err="1" smtClean="0">
+                <a:sym typeface="Wingdings" panose="05000000000000000000" pitchFamily="2" charset="2"/>
+              </a:rPr>
+              <a:t>ddepth</a:t>
+            </a:r>
+            <a:r>
+              <a:rPr lang="en-CA" dirty="0" smtClean="0">
+                <a:sym typeface="Wingdings" panose="05000000000000000000" pitchFamily="2" charset="2"/>
+              </a:rPr>
+              <a:t>)</a:t>
+            </a:r>
+            <a:endParaRPr lang="en-CA" dirty="0"/>
+          </a:p>
+        </p:txBody>
+      </p:sp>
+      <p:pic>
+        <p:nvPicPr>
+          <p:cNvPr id="4" name="Content Placeholder 3"/>
+          <p:cNvPicPr>
+            <a:picLocks noGrp="1" noChangeAspect="1"/>
+          </p:cNvPicPr>
+          <p:nvPr>
+            <p:ph idx="1"/>
+          </p:nvPr>
+        </p:nvPicPr>
+        <p:blipFill>
+          <a:blip r:embed="rId2">
+            <a:extLst>
+              <a:ext uri="{28A0092B-C50C-407E-A947-70E740481C1C}">
+                <a14:useLocalDpi xmlns:a14="http://schemas.microsoft.com/office/drawing/2010/main" val="0"/>
+              </a:ext>
+            </a:extLst>
+          </a:blip>
+          <a:stretch>
+            <a:fillRect/>
+          </a:stretch>
+        </p:blipFill>
+        <p:spPr>
+          <a:xfrm>
+            <a:off x="646111" y="1853248"/>
+            <a:ext cx="3250794" cy="3250794"/>
+          </a:xfrm>
+        </p:spPr>
+      </p:pic>
+      <p:pic>
+        <p:nvPicPr>
+          <p:cNvPr id="5" name="Picture 4"/>
+          <p:cNvPicPr>
+            <a:picLocks noChangeAspect="1"/>
+          </p:cNvPicPr>
+          <p:nvPr/>
+        </p:nvPicPr>
+        <p:blipFill>
+          <a:blip r:embed="rId3">
+            <a:extLst>
+              <a:ext uri="{28A0092B-C50C-407E-A947-70E740481C1C}">
+                <a14:useLocalDpi xmlns:a14="http://schemas.microsoft.com/office/drawing/2010/main" val="0"/>
+              </a:ext>
+            </a:extLst>
+          </a:blip>
+          <a:stretch>
+            <a:fillRect/>
+          </a:stretch>
+        </p:blipFill>
+        <p:spPr>
+          <a:xfrm>
+            <a:off x="4564607" y="1853248"/>
+            <a:ext cx="3250794" cy="3250794"/>
+          </a:xfrm>
+          <a:prstGeom prst="rect">
+            <a:avLst/>
+          </a:prstGeom>
+        </p:spPr>
+      </p:pic>
+      <p:pic>
+        <p:nvPicPr>
+          <p:cNvPr id="6" name="Picture 5"/>
+          <p:cNvPicPr>
+            <a:picLocks noChangeAspect="1"/>
+          </p:cNvPicPr>
+          <p:nvPr/>
+        </p:nvPicPr>
+        <p:blipFill>
+          <a:blip r:embed="rId4">
+            <a:extLst>
+              <a:ext uri="{28A0092B-C50C-407E-A947-70E740481C1C}">
+                <a14:useLocalDpi xmlns:a14="http://schemas.microsoft.com/office/drawing/2010/main" val="0"/>
+              </a:ext>
+            </a:extLst>
+          </a:blip>
+          <a:stretch>
+            <a:fillRect/>
+          </a:stretch>
+        </p:blipFill>
+        <p:spPr>
+          <a:xfrm>
+            <a:off x="8341848" y="1853248"/>
+            <a:ext cx="3250794" cy="3250794"/>
+          </a:xfrm>
+          <a:prstGeom prst="rect">
+            <a:avLst/>
+          </a:prstGeom>
+        </p:spPr>
+      </p:pic>
+      <p:sp>
+        <p:nvSpPr>
+          <p:cNvPr id="7" name="TextBox 6"/>
+          <p:cNvSpPr txBox="1"/>
+          <p:nvPr/>
+        </p:nvSpPr>
+        <p:spPr>
+          <a:xfrm>
+            <a:off x="646111" y="5104042"/>
+            <a:ext cx="3250793" cy="369332"/>
+          </a:xfrm>
+          <a:prstGeom prst="rect">
+            <a:avLst/>
+          </a:prstGeom>
+          <a:noFill/>
+        </p:spPr>
+        <p:txBody>
+          <a:bodyPr wrap="square" rtlCol="0">
+            <a:spAutoFit/>
+          </a:bodyPr>
+          <a:lstStyle/>
+          <a:p>
+            <a:pPr algn="ctr"/>
+            <a:r>
+              <a:rPr lang="en-CA" dirty="0" smtClean="0"/>
+              <a:t>10S, 1D, 5m42s</a:t>
+            </a:r>
+            <a:endParaRPr lang="en-CA" dirty="0"/>
+          </a:p>
+        </p:txBody>
+      </p:sp>
+      <p:sp>
+        <p:nvSpPr>
+          <p:cNvPr id="8" name="TextBox 7"/>
+          <p:cNvSpPr txBox="1"/>
+          <p:nvPr/>
+        </p:nvSpPr>
+        <p:spPr>
+          <a:xfrm>
+            <a:off x="4564607" y="5104042"/>
+            <a:ext cx="3250793" cy="369332"/>
+          </a:xfrm>
+          <a:prstGeom prst="rect">
+            <a:avLst/>
+          </a:prstGeom>
+          <a:noFill/>
+        </p:spPr>
+        <p:txBody>
+          <a:bodyPr wrap="square" rtlCol="0">
+            <a:spAutoFit/>
+          </a:bodyPr>
+          <a:lstStyle/>
+          <a:p>
+            <a:pPr algn="ctr"/>
+            <a:r>
+              <a:rPr lang="en-CA" dirty="0" smtClean="0"/>
+              <a:t>20S, 1D, 11m26s</a:t>
+            </a:r>
+            <a:endParaRPr lang="en-CA" dirty="0"/>
+          </a:p>
+        </p:txBody>
+      </p:sp>
+      <p:sp>
+        <p:nvSpPr>
+          <p:cNvPr id="9" name="TextBox 8"/>
+          <p:cNvSpPr txBox="1"/>
+          <p:nvPr/>
+        </p:nvSpPr>
+        <p:spPr>
+          <a:xfrm>
+            <a:off x="8341848" y="5125199"/>
+            <a:ext cx="3250793" cy="369332"/>
+          </a:xfrm>
+          <a:prstGeom prst="rect">
+            <a:avLst/>
+          </a:prstGeom>
+          <a:noFill/>
+        </p:spPr>
+        <p:txBody>
+          <a:bodyPr wrap="square" rtlCol="0">
+            <a:spAutoFit/>
+          </a:bodyPr>
+          <a:lstStyle/>
+          <a:p>
+            <a:pPr algn="ctr"/>
+            <a:r>
+              <a:rPr lang="en-CA" dirty="0" smtClean="0"/>
+              <a:t>40S, 4D, 23m25s</a:t>
+            </a:r>
+            <a:endParaRPr lang="en-CA" dirty="0"/>
+          </a:p>
+        </p:txBody>
+      </p:sp>
+      <p:pic>
+        <p:nvPicPr>
+          <p:cNvPr id="3" name="Picture 2"/>
+          <p:cNvPicPr>
+            <a:picLocks noChangeAspect="1"/>
+          </p:cNvPicPr>
+          <p:nvPr/>
+        </p:nvPicPr>
+        <p:blipFill>
+          <a:blip r:embed="rId5">
+            <a:extLst>
+              <a:ext uri="{28A0092B-C50C-407E-A947-70E740481C1C}">
+                <a14:useLocalDpi xmlns:a14="http://schemas.microsoft.com/office/drawing/2010/main" val="0"/>
+              </a:ext>
+            </a:extLst>
+          </a:blip>
+          <a:stretch>
+            <a:fillRect/>
+          </a:stretch>
+        </p:blipFill>
+        <p:spPr>
+          <a:xfrm>
+            <a:off x="646110" y="1853248"/>
+            <a:ext cx="3250794" cy="3250794"/>
+          </a:xfrm>
+          <a:prstGeom prst="rect">
+            <a:avLst/>
+          </a:prstGeom>
+        </p:spPr>
+      </p:pic>
+      <p:pic>
+        <p:nvPicPr>
+          <p:cNvPr id="10" name="Picture 9"/>
+          <p:cNvPicPr>
+            <a:picLocks noChangeAspect="1"/>
+          </p:cNvPicPr>
+          <p:nvPr/>
+        </p:nvPicPr>
+        <p:blipFill>
+          <a:blip r:embed="rId6">
+            <a:extLst>
+              <a:ext uri="{28A0092B-C50C-407E-A947-70E740481C1C}">
+                <a14:useLocalDpi xmlns:a14="http://schemas.microsoft.com/office/drawing/2010/main" val="0"/>
+              </a:ext>
+            </a:extLst>
+          </a:blip>
+          <a:stretch>
+            <a:fillRect/>
+          </a:stretch>
+        </p:blipFill>
+        <p:spPr>
+          <a:xfrm>
+            <a:off x="4564606" y="1853248"/>
+            <a:ext cx="3250794" cy="3250794"/>
+          </a:xfrm>
+          <a:prstGeom prst="rect">
+            <a:avLst/>
+          </a:prstGeom>
+        </p:spPr>
+      </p:pic>
+      <p:pic>
+        <p:nvPicPr>
+          <p:cNvPr id="11" name="Picture 10"/>
+          <p:cNvPicPr>
+            <a:picLocks noChangeAspect="1"/>
+          </p:cNvPicPr>
+          <p:nvPr/>
+        </p:nvPicPr>
+        <p:blipFill>
+          <a:blip r:embed="rId7">
+            <a:extLst>
+              <a:ext uri="{28A0092B-C50C-407E-A947-70E740481C1C}">
+                <a14:useLocalDpi xmlns:a14="http://schemas.microsoft.com/office/drawing/2010/main" val="0"/>
+              </a:ext>
+            </a:extLst>
+          </a:blip>
+          <a:stretch>
+            <a:fillRect/>
+          </a:stretch>
+        </p:blipFill>
+        <p:spPr>
+          <a:xfrm>
+            <a:off x="8344695" y="1853248"/>
+            <a:ext cx="3250794" cy="3250794"/>
+          </a:xfrm>
+          <a:prstGeom prst="rect">
+            <a:avLst/>
+          </a:prstGeom>
+        </p:spPr>
+      </p:pic>
+    </p:spTree>
+    <p:extLst>
+      <p:ext uri="{BB962C8B-B14F-4D97-AF65-F5344CB8AC3E}">
+        <p14:creationId xmlns:p14="http://schemas.microsoft.com/office/powerpoint/2010/main" val="3883614210"/>
+      </p:ext>
+    </p:extLst>
+  </p:cSld>
+  <p:clrMapOvr>
+    <a:masterClrMapping/>
+  </p:clrMapOvr>
+  <p:timing>
+    <p:tnLst>
+      <p:par>
+        <p:cTn id="1" dur="indefinite" restart="never" nodeType="tmRoot"/>
+      </p:par>
+    </p:tnLst>
+  </p:timing>
+</p:sld>
+</file>
+
+<file path=ppt/slides/slide11.xml><?xml version="1.0" encoding="utf-8"?>
+<p:sld xmlns:a="http://schemas.openxmlformats.org/drawingml/2006/main" xmlns:r="http://schemas.openxmlformats.org/officeDocument/2006/relationships" xmlns:p="http://schemas.openxmlformats.org/presentationml/2006/main">
+  <p:cSld>
+    <p:spTree>
+      <p:nvGrpSpPr>
+        <p:cNvPr id="1" name=""/>
+        <p:cNvGrpSpPr/>
+        <p:nvPr/>
+      </p:nvGrpSpPr>
+      <p:grpSpPr>
+        <a:xfrm>
+          <a:off x="0" y="0"/>
+          <a:ext cx="0" cy="0"/>
+          <a:chOff x="0" y="0"/>
+          <a:chExt cx="0" cy="0"/>
+        </a:xfrm>
+      </p:grpSpPr>
+      <p:sp>
+        <p:nvSpPr>
+          <p:cNvPr id="2" name="Title 1"/>
+          <p:cNvSpPr>
+            <a:spLocks noGrp="1"/>
+          </p:cNvSpPr>
+          <p:nvPr>
+            <p:ph type="title"/>
+          </p:nvPr>
+        </p:nvSpPr>
+        <p:spPr/>
+        <p:txBody>
+          <a:bodyPr/>
+          <a:lstStyle/>
+          <a:p>
+            <a:r>
+              <a:rPr lang="en-CA" dirty="0" smtClean="0"/>
+              <a:t>Results (</a:t>
+            </a:r>
+            <a:r>
+              <a:rPr lang="en-CA" dirty="0" err="1" smtClean="0"/>
+              <a:t>s</a:t>
+            </a:r>
+            <a:r>
+              <a:rPr lang="en-CA" dirty="0" err="1" smtClean="0">
+                <a:sym typeface="Wingdings" panose="05000000000000000000" pitchFamily="2" charset="2"/>
+              </a:rPr>
+              <a:t>samples</a:t>
+            </a:r>
+            <a:r>
+              <a:rPr lang="en-CA" dirty="0" smtClean="0">
+                <a:sym typeface="Wingdings" panose="05000000000000000000" pitchFamily="2" charset="2"/>
+              </a:rPr>
+              <a:t>, </a:t>
+            </a:r>
+            <a:r>
+              <a:rPr lang="en-CA" dirty="0" err="1" smtClean="0">
+                <a:sym typeface="Wingdings" panose="05000000000000000000" pitchFamily="2" charset="2"/>
+              </a:rPr>
+              <a:t>ddepth</a:t>
+            </a:r>
+            <a:r>
+              <a:rPr lang="en-CA" dirty="0" smtClean="0">
+                <a:sym typeface="Wingdings" panose="05000000000000000000" pitchFamily="2" charset="2"/>
+              </a:rPr>
+              <a:t>)</a:t>
+            </a:r>
+            <a:endParaRPr lang="en-CA" dirty="0"/>
+          </a:p>
+        </p:txBody>
+      </p:sp>
+      <p:pic>
+        <p:nvPicPr>
+          <p:cNvPr id="4" name="Content Placeholder 3"/>
+          <p:cNvPicPr>
+            <a:picLocks noGrp="1" noChangeAspect="1"/>
+          </p:cNvPicPr>
+          <p:nvPr>
+            <p:ph idx="1"/>
+          </p:nvPr>
+        </p:nvPicPr>
+        <p:blipFill>
+          <a:blip r:embed="rId2">
+            <a:extLst>
+              <a:ext uri="{28A0092B-C50C-407E-A947-70E740481C1C}">
+                <a14:useLocalDpi xmlns:a14="http://schemas.microsoft.com/office/drawing/2010/main" val="0"/>
+              </a:ext>
+            </a:extLst>
+          </a:blip>
+          <a:stretch>
+            <a:fillRect/>
+          </a:stretch>
+        </p:blipFill>
+        <p:spPr>
+          <a:xfrm>
+            <a:off x="646111" y="1853248"/>
+            <a:ext cx="3250794" cy="3250794"/>
+          </a:xfrm>
+        </p:spPr>
+      </p:pic>
+      <p:pic>
+        <p:nvPicPr>
+          <p:cNvPr id="5" name="Picture 4"/>
+          <p:cNvPicPr>
+            <a:picLocks noChangeAspect="1"/>
+          </p:cNvPicPr>
+          <p:nvPr/>
+        </p:nvPicPr>
+        <p:blipFill>
+          <a:blip r:embed="rId3">
+            <a:extLst>
+              <a:ext uri="{28A0092B-C50C-407E-A947-70E740481C1C}">
+                <a14:useLocalDpi xmlns:a14="http://schemas.microsoft.com/office/drawing/2010/main" val="0"/>
+              </a:ext>
+            </a:extLst>
+          </a:blip>
+          <a:stretch>
+            <a:fillRect/>
+          </a:stretch>
+        </p:blipFill>
+        <p:spPr>
+          <a:xfrm>
+            <a:off x="4564607" y="1853248"/>
+            <a:ext cx="3250794" cy="3250794"/>
+          </a:xfrm>
+          <a:prstGeom prst="rect">
+            <a:avLst/>
+          </a:prstGeom>
+        </p:spPr>
+      </p:pic>
+      <p:pic>
+        <p:nvPicPr>
+          <p:cNvPr id="6" name="Picture 5"/>
+          <p:cNvPicPr>
+            <a:picLocks noChangeAspect="1"/>
+          </p:cNvPicPr>
+          <p:nvPr/>
+        </p:nvPicPr>
+        <p:blipFill>
+          <a:blip r:embed="rId4">
+            <a:extLst>
+              <a:ext uri="{28A0092B-C50C-407E-A947-70E740481C1C}">
+                <a14:useLocalDpi xmlns:a14="http://schemas.microsoft.com/office/drawing/2010/main" val="0"/>
+              </a:ext>
+            </a:extLst>
+          </a:blip>
+          <a:stretch>
+            <a:fillRect/>
+          </a:stretch>
+        </p:blipFill>
+        <p:spPr>
+          <a:xfrm>
+            <a:off x="8341848" y="1853248"/>
+            <a:ext cx="3250794" cy="3250794"/>
+          </a:xfrm>
+          <a:prstGeom prst="rect">
+            <a:avLst/>
+          </a:prstGeom>
+        </p:spPr>
+      </p:pic>
+      <p:sp>
+        <p:nvSpPr>
+          <p:cNvPr id="7" name="TextBox 6"/>
+          <p:cNvSpPr txBox="1"/>
+          <p:nvPr/>
+        </p:nvSpPr>
+        <p:spPr>
+          <a:xfrm>
+            <a:off x="646111" y="5104042"/>
+            <a:ext cx="3250793" cy="646331"/>
+          </a:xfrm>
+          <a:prstGeom prst="rect">
+            <a:avLst/>
+          </a:prstGeom>
+          <a:noFill/>
+        </p:spPr>
+        <p:txBody>
+          <a:bodyPr wrap="square" rtlCol="0">
+            <a:spAutoFit/>
+          </a:bodyPr>
+          <a:lstStyle/>
+          <a:p>
+            <a:pPr algn="ctr"/>
+            <a:r>
+              <a:rPr lang="en-CA" dirty="0" smtClean="0"/>
+              <a:t>100S, 1D, 26s,</a:t>
+            </a:r>
+            <a:r>
+              <a:rPr lang="en-CA" dirty="0"/>
+              <a:t> 42m10s</a:t>
+            </a:r>
+          </a:p>
+          <a:p>
+            <a:pPr algn="ctr"/>
+            <a:r>
+              <a:rPr lang="en-CA" dirty="0" smtClean="0"/>
+              <a:t>Multithread: 2m52s</a:t>
+            </a:r>
+            <a:endParaRPr lang="en-CA" dirty="0"/>
+          </a:p>
+        </p:txBody>
+      </p:sp>
+      <p:sp>
+        <p:nvSpPr>
+          <p:cNvPr id="8" name="TextBox 7"/>
+          <p:cNvSpPr txBox="1"/>
+          <p:nvPr/>
+        </p:nvSpPr>
+        <p:spPr>
+          <a:xfrm>
+            <a:off x="4564607" y="5104042"/>
+            <a:ext cx="3250793" cy="923330"/>
+          </a:xfrm>
+          <a:prstGeom prst="rect">
+            <a:avLst/>
+          </a:prstGeom>
+          <a:noFill/>
+        </p:spPr>
+        <p:txBody>
+          <a:bodyPr wrap="square" rtlCol="0">
+            <a:spAutoFit/>
+          </a:bodyPr>
+          <a:lstStyle/>
+          <a:p>
+            <a:pPr algn="ctr"/>
+            <a:r>
+              <a:rPr lang="en-CA" dirty="0" smtClean="0"/>
+              <a:t>100S, 16D, 42m10s</a:t>
+            </a:r>
+          </a:p>
+          <a:p>
+            <a:pPr algn="ctr"/>
+            <a:r>
+              <a:rPr lang="en-CA" dirty="0" smtClean="0"/>
+              <a:t>Multithread</a:t>
+            </a:r>
+            <a:r>
+              <a:rPr lang="en-CA" dirty="0"/>
+              <a:t>: </a:t>
+            </a:r>
+            <a:r>
+              <a:rPr lang="en-CA" dirty="0" smtClean="0"/>
+              <a:t>2m59s</a:t>
+            </a:r>
+            <a:endParaRPr lang="en-CA" dirty="0"/>
+          </a:p>
+          <a:p>
+            <a:pPr algn="ctr"/>
+            <a:endParaRPr lang="en-CA" dirty="0"/>
+          </a:p>
+        </p:txBody>
+      </p:sp>
+      <p:sp>
+        <p:nvSpPr>
+          <p:cNvPr id="9" name="TextBox 8"/>
+          <p:cNvSpPr txBox="1"/>
+          <p:nvPr/>
+        </p:nvSpPr>
+        <p:spPr>
+          <a:xfrm>
+            <a:off x="8341848" y="5125199"/>
+            <a:ext cx="3250793" cy="646331"/>
+          </a:xfrm>
+          <a:prstGeom prst="rect">
+            <a:avLst/>
+          </a:prstGeom>
+          <a:noFill/>
+        </p:spPr>
+        <p:txBody>
+          <a:bodyPr wrap="square" rtlCol="0">
+            <a:spAutoFit/>
+          </a:bodyPr>
+          <a:lstStyle/>
+          <a:p>
+            <a:pPr algn="ctr"/>
+            <a:r>
+              <a:rPr lang="en-CA" dirty="0" smtClean="0"/>
+              <a:t>200S, 16D, Multithread: 5m53s</a:t>
+            </a:r>
+            <a:endParaRPr lang="en-CA" dirty="0"/>
+          </a:p>
+        </p:txBody>
+      </p:sp>
+      <p:pic>
+        <p:nvPicPr>
+          <p:cNvPr id="3" name="Picture 2"/>
+          <p:cNvPicPr>
+            <a:picLocks noChangeAspect="1"/>
+          </p:cNvPicPr>
+          <p:nvPr/>
+        </p:nvPicPr>
+        <p:blipFill>
+          <a:blip r:embed="rId5">
+            <a:extLst>
+              <a:ext uri="{28A0092B-C50C-407E-A947-70E740481C1C}">
+                <a14:useLocalDpi xmlns:a14="http://schemas.microsoft.com/office/drawing/2010/main" val="0"/>
+              </a:ext>
+            </a:extLst>
+          </a:blip>
+          <a:stretch>
+            <a:fillRect/>
+          </a:stretch>
+        </p:blipFill>
+        <p:spPr>
+          <a:xfrm>
+            <a:off x="646110" y="1853248"/>
+            <a:ext cx="3250794" cy="3250794"/>
+          </a:xfrm>
+          <a:prstGeom prst="rect">
+            <a:avLst/>
+          </a:prstGeom>
+        </p:spPr>
+      </p:pic>
+      <p:pic>
+        <p:nvPicPr>
+          <p:cNvPr id="10" name="Picture 9"/>
+          <p:cNvPicPr>
+            <a:picLocks noChangeAspect="1"/>
+          </p:cNvPicPr>
+          <p:nvPr/>
+        </p:nvPicPr>
+        <p:blipFill>
+          <a:blip r:embed="rId6">
+            <a:extLst>
+              <a:ext uri="{28A0092B-C50C-407E-A947-70E740481C1C}">
+                <a14:useLocalDpi xmlns:a14="http://schemas.microsoft.com/office/drawing/2010/main" val="0"/>
+              </a:ext>
+            </a:extLst>
+          </a:blip>
+          <a:stretch>
+            <a:fillRect/>
+          </a:stretch>
+        </p:blipFill>
+        <p:spPr>
+          <a:xfrm>
+            <a:off x="4564606" y="1853248"/>
+            <a:ext cx="3250794" cy="3250794"/>
+          </a:xfrm>
+          <a:prstGeom prst="rect">
+            <a:avLst/>
+          </a:prstGeom>
+        </p:spPr>
+      </p:pic>
+      <p:pic>
+        <p:nvPicPr>
+          <p:cNvPr id="11" name="Picture 10"/>
+          <p:cNvPicPr>
+            <a:picLocks noChangeAspect="1"/>
+          </p:cNvPicPr>
+          <p:nvPr/>
+        </p:nvPicPr>
+        <p:blipFill>
+          <a:blip r:embed="rId7">
+            <a:extLst>
+              <a:ext uri="{28A0092B-C50C-407E-A947-70E740481C1C}">
+                <a14:useLocalDpi xmlns:a14="http://schemas.microsoft.com/office/drawing/2010/main" val="0"/>
+              </a:ext>
+            </a:extLst>
+          </a:blip>
+          <a:stretch>
+            <a:fillRect/>
+          </a:stretch>
+        </p:blipFill>
+        <p:spPr>
+          <a:xfrm>
+            <a:off x="8341847" y="1853248"/>
+            <a:ext cx="3250794" cy="3250794"/>
+          </a:xfrm>
+          <a:prstGeom prst="rect">
+            <a:avLst/>
+          </a:prstGeom>
+        </p:spPr>
+      </p:pic>
+    </p:spTree>
+    <p:extLst>
+      <p:ext uri="{BB962C8B-B14F-4D97-AF65-F5344CB8AC3E}">
+        <p14:creationId xmlns:p14="http://schemas.microsoft.com/office/powerpoint/2010/main" val="3910909450"/>
+      </p:ext>
+    </p:extLst>
+  </p:cSld>
+  <p:clrMapOvr>
+    <a:masterClrMapping/>
+  </p:clrMapOvr>
+  <p:timing>
+    <p:tnLst>
+      <p:par>
+        <p:cTn id="1" dur="indefinite" restart="never" nodeType="tmRoot"/>
+      </p:par>
+    </p:tnLst>
+  </p:timing>
+</p:sld>
+</file>
+
+<file path=ppt/slides/slide12.xml><?xml version="1.0" encoding="utf-8"?>
+<p:sld xmlns:a="http://schemas.openxmlformats.org/drawingml/2006/main" xmlns:r="http://schemas.openxmlformats.org/officeDocument/2006/relationships" xmlns:p="http://schemas.openxmlformats.org/presentationml/2006/main">
+  <p:cSld>
+    <p:spTree>
+      <p:nvGrpSpPr>
+        <p:cNvPr id="1" name=""/>
+        <p:cNvGrpSpPr/>
+        <p:nvPr/>
+      </p:nvGrpSpPr>
+      <p:grpSpPr>
+        <a:xfrm>
+          <a:off x="0" y="0"/>
+          <a:ext cx="0" cy="0"/>
+          <a:chOff x="0" y="0"/>
+          <a:chExt cx="0" cy="0"/>
+        </a:xfrm>
+      </p:grpSpPr>
+      <p:sp>
+        <p:nvSpPr>
+          <p:cNvPr id="2" name="Title 1"/>
+          <p:cNvSpPr>
+            <a:spLocks noGrp="1"/>
+          </p:cNvSpPr>
+          <p:nvPr>
+            <p:ph type="title"/>
+          </p:nvPr>
+        </p:nvSpPr>
+        <p:spPr/>
+        <p:txBody>
+          <a:bodyPr/>
+          <a:lstStyle/>
+          <a:p>
+            <a:r>
+              <a:rPr lang="en-CA" dirty="0" smtClean="0"/>
+              <a:t>Observations</a:t>
+            </a:r>
+            <a:endParaRPr lang="en-CA" dirty="0"/>
+          </a:p>
+        </p:txBody>
+      </p:sp>
+      <p:sp>
+        <p:nvSpPr>
+          <p:cNvPr id="3" name="Content Placeholder 2"/>
+          <p:cNvSpPr>
+            <a:spLocks noGrp="1"/>
+          </p:cNvSpPr>
+          <p:nvPr>
+            <p:ph idx="1"/>
+          </p:nvPr>
+        </p:nvSpPr>
+        <p:spPr/>
+        <p:txBody>
+          <a:bodyPr/>
+          <a:lstStyle/>
+          <a:p>
+            <a:r>
+              <a:rPr lang="en-CA" dirty="0" smtClean="0"/>
+              <a:t>Strange solid black </a:t>
+            </a:r>
+            <a:r>
+              <a:rPr lang="en-CA" dirty="0" err="1" smtClean="0"/>
+              <a:t>artifacting</a:t>
+            </a:r>
+            <a:r>
+              <a:rPr lang="en-CA" dirty="0" smtClean="0"/>
+              <a:t> that persists at s=200, d=16</a:t>
+            </a:r>
+          </a:p>
+          <a:p>
+            <a:r>
+              <a:rPr lang="en-CA" dirty="0" smtClean="0"/>
+              <a:t>Runtime for values of d converges</a:t>
+            </a:r>
+          </a:p>
+          <a:p>
+            <a:r>
+              <a:rPr lang="en-CA" dirty="0" smtClean="0"/>
+              <a:t>Runtime for values of s is linear</a:t>
+            </a:r>
+          </a:p>
+          <a:p>
+            <a:r>
+              <a:rPr lang="en-CA" dirty="0" smtClean="0"/>
+              <a:t>Multithreading is effective! 25x reduction using 25 threads</a:t>
+            </a:r>
+          </a:p>
+          <a:p>
+            <a:r>
+              <a:rPr lang="en-CA" dirty="0" smtClean="0"/>
+              <a:t>Increasing d brightens image (biased</a:t>
+            </a:r>
+            <a:r>
+              <a:rPr lang="en-CA" dirty="0" smtClean="0">
+                <a:sym typeface="Wingdings" panose="05000000000000000000" pitchFamily="2" charset="2"/>
+              </a:rPr>
+              <a:t>)</a:t>
+            </a:r>
+            <a:endParaRPr lang="en-CA" dirty="0"/>
+          </a:p>
+        </p:txBody>
+      </p:sp>
+    </p:spTree>
+    <p:extLst>
+      <p:ext uri="{BB962C8B-B14F-4D97-AF65-F5344CB8AC3E}">
+        <p14:creationId xmlns:p14="http://schemas.microsoft.com/office/powerpoint/2010/main" val="126916923"/>
+      </p:ext>
+    </p:extLst>
+  </p:cSld>
+  <p:clrMapOvr>
+    <a:masterClrMapping/>
+  </p:clrMapOvr>
+  <p:timing>
+    <p:tnLst>
+      <p:par>
+        <p:cTn id="1" dur="indefinite" restart="never" nodeType="tmRoot"/>
+      </p:par>
+    </p:tnLst>
+  </p:timing>
+</p:sld>
+</file>
+
+<file path=ppt/slides/slide13.xml><?xml version="1.0" encoding="utf-8"?>
+<p:sld xmlns:a="http://schemas.openxmlformats.org/drawingml/2006/main" xmlns:r="http://schemas.openxmlformats.org/officeDocument/2006/relationships" xmlns:p="http://schemas.openxmlformats.org/presentationml/2006/main">
+  <p:cSld>
+    <p:spTree>
+      <p:nvGrpSpPr>
+        <p:cNvPr id="1" name=""/>
+        <p:cNvGrpSpPr/>
+        <p:nvPr/>
+      </p:nvGrpSpPr>
+      <p:grpSpPr>
+        <a:xfrm>
+          <a:off x="0" y="0"/>
+          <a:ext cx="0" cy="0"/>
+          <a:chOff x="0" y="0"/>
+          <a:chExt cx="0" cy="0"/>
+        </a:xfrm>
+      </p:grpSpPr>
+      <p:sp>
+        <p:nvSpPr>
+          <p:cNvPr id="2" name="Title 1"/>
+          <p:cNvSpPr>
+            <a:spLocks noGrp="1"/>
+          </p:cNvSpPr>
+          <p:nvPr>
+            <p:ph type="title"/>
+          </p:nvPr>
+        </p:nvSpPr>
+        <p:spPr/>
+        <p:txBody>
+          <a:bodyPr/>
+          <a:lstStyle/>
+          <a:p>
+            <a:r>
+              <a:rPr lang="en-CA" dirty="0" smtClean="0"/>
+              <a:t>Further Work	</a:t>
+            </a:r>
+            <a:endParaRPr lang="en-CA" dirty="0"/>
+          </a:p>
+        </p:txBody>
+      </p:sp>
+      <p:sp>
+        <p:nvSpPr>
+          <p:cNvPr id="3" name="Content Placeholder 2"/>
+          <p:cNvSpPr>
+            <a:spLocks noGrp="1"/>
+          </p:cNvSpPr>
+          <p:nvPr>
+            <p:ph idx="1"/>
+          </p:nvPr>
+        </p:nvSpPr>
+        <p:spPr/>
+        <p:txBody>
+          <a:bodyPr/>
+          <a:lstStyle/>
+          <a:p>
+            <a:r>
+              <a:rPr lang="en-CA" dirty="0" smtClean="0"/>
+              <a:t>Use GPU rather than CPU</a:t>
+            </a:r>
+          </a:p>
+          <a:p>
+            <a:r>
+              <a:rPr lang="en-CA" dirty="0" smtClean="0"/>
+              <a:t>Specular reflection (mirror) &amp; refraction (transparency)</a:t>
+            </a:r>
+          </a:p>
+          <a:p>
+            <a:r>
+              <a:rPr lang="en-CA" dirty="0" smtClean="0"/>
+              <a:t>Better approaches to ray intersection than brute force, such as binary space partitioning or bounding volumes</a:t>
+            </a:r>
+          </a:p>
+          <a:p>
+            <a:r>
+              <a:rPr lang="en-CA" dirty="0" smtClean="0"/>
+              <a:t>Use Russian Roulette rather than determined depth d</a:t>
+            </a:r>
+          </a:p>
+          <a:p>
+            <a:pPr lvl="1"/>
+            <a:r>
+              <a:rPr lang="en-CA" dirty="0" smtClean="0"/>
+              <a:t>Unbiased</a:t>
+            </a:r>
+            <a:endParaRPr lang="en-CA" dirty="0"/>
+          </a:p>
+        </p:txBody>
+      </p:sp>
+    </p:spTree>
+    <p:extLst>
+      <p:ext uri="{BB962C8B-B14F-4D97-AF65-F5344CB8AC3E}">
+        <p14:creationId xmlns:p14="http://schemas.microsoft.com/office/powerpoint/2010/main" val="1805077723"/>
+      </p:ext>
+    </p:extLst>
+  </p:cSld>
+  <p:clrMapOvr>
+    <a:masterClrMapping/>
+  </p:clrMapOvr>
+  <p:timing>
+    <p:tnLst>
+      <p:par>
+        <p:cTn id="1" dur="indefinite" restart="never" nodeType="tmRoot"/>
+      </p:par>
+    </p:tnLst>
+  </p:timing>
+</p:sld>
+</file>
+
 <file path=ppt/slides/slide2.xml><?xml version="1.0" encoding="utf-8"?>
 <p:sld xmlns:a="http://schemas.openxmlformats.org/drawingml/2006/main" xmlns:r="http://schemas.openxmlformats.org/officeDocument/2006/relationships" xmlns:p="http://schemas.openxmlformats.org/presentationml/2006/main">
   <p:cSld>
@@ -6343,6 +7334,13 @@
   <p:clrMapOvr>
     <a:masterClrMapping/>
   </p:clrMapOvr>
+  <p:timing>
+    <p:tnLst>
+      <p:par>
+        <p:cTn id="1" dur="indefinite" restart="never" nodeType="tmRoot"/>
+      </p:par>
+    </p:tnLst>
+  </p:timing>
 </p:sld>
 </file>
 
@@ -6443,6 +7441,13 @@
   <p:clrMapOvr>
     <a:masterClrMapping/>
   </p:clrMapOvr>
+  <p:timing>
+    <p:tnLst>
+      <p:par>
+        <p:cTn id="1" dur="indefinite" restart="never" nodeType="tmRoot"/>
+      </p:par>
+    </p:tnLst>
+  </p:timing>
 </p:sld>
 </file>
 
@@ -6556,6 +7561,13 @@
   <p:clrMapOvr>
     <a:masterClrMapping/>
   </p:clrMapOvr>
+  <p:timing>
+    <p:tnLst>
+      <p:par>
+        <p:cTn id="1" dur="indefinite" restart="never" nodeType="tmRoot"/>
+      </p:par>
+    </p:tnLst>
+  </p:timing>
 </p:sld>
 </file>
 
@@ -6730,6 +7742,13 @@
   <p:clrMapOvr>
     <a:masterClrMapping/>
   </p:clrMapOvr>
+  <p:timing>
+    <p:tnLst>
+      <p:par>
+        <p:cTn id="1" dur="indefinite" restart="never" nodeType="tmRoot"/>
+      </p:par>
+    </p:tnLst>
+  </p:timing>
 </p:sld>
 </file>
 
@@ -6765,7 +7784,11 @@
           <a:bodyPr/>
           <a:lstStyle/>
           <a:p>
-            <a:endParaRPr lang="en-CA"/>
+            <a:r>
+              <a:rPr lang="en-CA" dirty="0" smtClean="0"/>
+              <a:t>The Algorithm</a:t>
+            </a:r>
+            <a:endParaRPr lang="en-CA" dirty="0"/>
           </a:p>
         </p:txBody>
       </p:sp>
@@ -6784,7 +7807,129 @@
           <a:bodyPr/>
           <a:lstStyle/>
           <a:p>
-            <a:endParaRPr lang="en-CA"/>
+            <a:r>
+              <a:rPr lang="en-CA" dirty="0" smtClean="0"/>
+              <a:t>Generate </a:t>
+            </a:r>
+            <a:r>
+              <a:rPr lang="en-CA" dirty="0"/>
+              <a:t>a ray from the camera (position </a:t>
+            </a:r>
+            <a:r>
+              <a:rPr lang="en-CA" dirty="0" err="1"/>
+              <a:t>x,y</a:t>
+            </a:r>
+            <a:r>
+              <a:rPr lang="en-CA" dirty="0"/>
+              <a:t>, horizontal and vertical fields of view </a:t>
+            </a:r>
+            <a:r>
+              <a:rPr lang="en-CA" dirty="0" err="1"/>
+              <a:t>u,v</a:t>
+            </a:r>
+            <a:r>
+              <a:rPr lang="en-CA" dirty="0"/>
+              <a:t>), passing through the image plane, with </a:t>
+            </a:r>
+            <a:r>
+              <a:rPr lang="en-CA" dirty="0" smtClean="0"/>
+              <a:t>weight </a:t>
+            </a:r>
+            <a:r>
+              <a:rPr lang="en-CA" dirty="0"/>
+              <a:t>= </a:t>
+            </a:r>
+            <a:r>
+              <a:rPr lang="en-CA" dirty="0" smtClean="0"/>
+              <a:t>1</a:t>
+            </a:r>
+            <a:endParaRPr lang="en-CA" dirty="0"/>
+          </a:p>
+          <a:p>
+            <a:r>
+              <a:rPr lang="en-CA" dirty="0" smtClean="0"/>
+              <a:t>Find </a:t>
+            </a:r>
+            <a:r>
+              <a:rPr lang="en-CA" dirty="0"/>
+              <a:t>the point of intersection with the nearest surface</a:t>
+            </a:r>
+          </a:p>
+          <a:p>
+            <a:r>
+              <a:rPr lang="en-CA" dirty="0" smtClean="0"/>
+              <a:t>Determine </a:t>
+            </a:r>
+            <a:r>
+              <a:rPr lang="en-CA" dirty="0"/>
+              <a:t>whether the surface is a light source or not (as indicated by a special coefficients for light emittance)</a:t>
+            </a:r>
+          </a:p>
+          <a:p>
+            <a:r>
+              <a:rPr lang="en-CA" dirty="0" smtClean="0"/>
+              <a:t>if </a:t>
+            </a:r>
+            <a:r>
+              <a:rPr lang="en-CA" dirty="0"/>
+              <a:t>it is a light source, return </a:t>
+            </a:r>
+            <a:r>
+              <a:rPr lang="en-CA" dirty="0" smtClean="0"/>
+              <a:t>weight </a:t>
+            </a:r>
+            <a:r>
+              <a:rPr lang="en-CA" dirty="0"/>
+              <a:t>* </a:t>
+            </a:r>
+            <a:r>
+              <a:rPr lang="en-CA" dirty="0" smtClean="0"/>
+              <a:t>light</a:t>
+            </a:r>
+            <a:endParaRPr lang="en-CA" dirty="0"/>
+          </a:p>
+          <a:p>
+            <a:r>
+              <a:rPr lang="en-CA" dirty="0" smtClean="0"/>
+              <a:t>if </a:t>
+            </a:r>
+            <a:r>
+              <a:rPr lang="en-CA" dirty="0"/>
+              <a:t>not, </a:t>
+            </a:r>
+            <a:r>
+              <a:rPr lang="en-CA" dirty="0" smtClean="0"/>
+              <a:t>weight *= (</a:t>
+            </a:r>
+            <a:r>
+              <a:rPr lang="en-CA" dirty="0" err="1" smtClean="0"/>
+              <a:t>Ks+Kd+Ka</a:t>
+            </a:r>
+            <a:r>
+              <a:rPr lang="en-CA" dirty="0" smtClean="0"/>
+              <a:t>)/3 </a:t>
+            </a:r>
+            <a:r>
+              <a:rPr lang="en-CA" dirty="0"/>
+              <a:t>and randomly scatter a new ray according to a probability density function (pdf) approximating its bidirectional </a:t>
+            </a:r>
+            <a:r>
+              <a:rPr lang="en-CA" dirty="0" smtClean="0"/>
+              <a:t>reflectance </a:t>
+            </a:r>
+            <a:r>
+              <a:rPr lang="en-CA" dirty="0"/>
+              <a:t>distribution function (</a:t>
+            </a:r>
+            <a:r>
+              <a:rPr lang="en-CA" dirty="0" err="1"/>
+              <a:t>brdf</a:t>
+            </a:r>
+            <a:r>
+              <a:rPr lang="en-CA" dirty="0"/>
+              <a:t>), and go to step 2</a:t>
+            </a:r>
+            <a:endParaRPr lang="en-CA" dirty="0"/>
           </a:p>
         </p:txBody>
       </p:sp>
@@ -6798,6 +7943,517 @@
   <p:clrMapOvr>
     <a:masterClrMapping/>
   </p:clrMapOvr>
+  <p:timing>
+    <p:tnLst>
+      <p:par>
+        <p:cTn id="1" dur="indefinite" restart="never" nodeType="tmRoot"/>
+      </p:par>
+    </p:tnLst>
+  </p:timing>
+</p:sld>
+</file>
+
+<file path=ppt/slides/slide7.xml><?xml version="1.0" encoding="utf-8"?>
+<p:sld xmlns:a="http://schemas.openxmlformats.org/drawingml/2006/main" xmlns:r="http://schemas.openxmlformats.org/officeDocument/2006/relationships" xmlns:p="http://schemas.openxmlformats.org/presentationml/2006/main">
+  <p:cSld>
+    <p:spTree>
+      <p:nvGrpSpPr>
+        <p:cNvPr id="1" name=""/>
+        <p:cNvGrpSpPr/>
+        <p:nvPr/>
+      </p:nvGrpSpPr>
+      <p:grpSpPr>
+        <a:xfrm>
+          <a:off x="0" y="0"/>
+          <a:ext cx="0" cy="0"/>
+          <a:chOff x="0" y="0"/>
+          <a:chExt cx="0" cy="0"/>
+        </a:xfrm>
+      </p:grpSpPr>
+      <p:sp>
+        <p:nvSpPr>
+          <p:cNvPr id="2" name="Title 1"/>
+          <p:cNvSpPr>
+            <a:spLocks noGrp="1"/>
+          </p:cNvSpPr>
+          <p:nvPr>
+            <p:ph type="title"/>
+          </p:nvPr>
+        </p:nvSpPr>
+        <p:spPr/>
+        <p:txBody>
+          <a:bodyPr/>
+          <a:lstStyle/>
+          <a:p>
+            <a:r>
+              <a:rPr lang="en-CA" dirty="0" smtClean="0"/>
+              <a:t>The Probability Density Function </a:t>
+            </a:r>
+            <a:r>
+              <a:rPr lang="en-CA" dirty="0"/>
+              <a:t>(pdf)</a:t>
+            </a:r>
+          </a:p>
+        </p:txBody>
+      </p:sp>
+      <p:sp>
+        <p:nvSpPr>
+          <p:cNvPr id="3" name="Content Placeholder 2"/>
+          <p:cNvSpPr>
+            <a:spLocks noGrp="1"/>
+          </p:cNvSpPr>
+          <p:nvPr>
+            <p:ph idx="1"/>
+          </p:nvPr>
+        </p:nvSpPr>
+        <p:spPr/>
+        <p:txBody>
+          <a:bodyPr/>
+          <a:lstStyle/>
+          <a:p>
+            <a:r>
+              <a:rPr lang="en-CA" dirty="0" smtClean="0"/>
+              <a:t>Our choice: Random Uniform: choose any ray going out of the hemisphere</a:t>
+            </a:r>
+            <a:endParaRPr lang="en-CA" dirty="0"/>
+          </a:p>
+        </p:txBody>
+      </p:sp>
+      <p:pic>
+        <p:nvPicPr>
+          <p:cNvPr id="4" name="Picture 2" descr="https://upload.wikimedia.org/wikipedia/commons/d/d1/Rendering_eq.png"/>
+          <p:cNvPicPr>
+            <a:picLocks noChangeAspect="1" noChangeArrowheads="1"/>
+          </p:cNvPicPr>
+          <p:nvPr/>
+        </p:nvPicPr>
+        <p:blipFill>
+          <a:blip r:embed="rId2">
+            <a:extLst>
+              <a:ext uri="{28A0092B-C50C-407E-A947-70E740481C1C}">
+                <a14:useLocalDpi xmlns:a14="http://schemas.microsoft.com/office/drawing/2010/main" val="0"/>
+              </a:ext>
+            </a:extLst>
+          </a:blip>
+          <a:srcRect/>
+          <a:stretch>
+            <a:fillRect/>
+          </a:stretch>
+        </p:blipFill>
+        <p:spPr bwMode="auto">
+          <a:xfrm>
+            <a:off x="1952408" y="3067050"/>
+            <a:ext cx="7038975" cy="3790950"/>
+          </a:xfrm>
+          <a:prstGeom prst="rect">
+            <a:avLst/>
+          </a:prstGeom>
+          <a:noFill/>
+          <a:extLst>
+            <a:ext uri="{909E8E84-426E-40DD-AFC4-6F175D3DCCD1}">
+              <a14:hiddenFill xmlns:a14="http://schemas.microsoft.com/office/drawing/2010/main">
+                <a:solidFill>
+                  <a:srgbClr val="FFFFFF"/>
+                </a:solidFill>
+              </a14:hiddenFill>
+            </a:ext>
+          </a:extLst>
+        </p:spPr>
+      </p:pic>
+    </p:spTree>
+    <p:extLst>
+      <p:ext uri="{BB962C8B-B14F-4D97-AF65-F5344CB8AC3E}">
+        <p14:creationId xmlns:p14="http://schemas.microsoft.com/office/powerpoint/2010/main" val="2590559775"/>
+      </p:ext>
+    </p:extLst>
+  </p:cSld>
+  <p:clrMapOvr>
+    <a:masterClrMapping/>
+  </p:clrMapOvr>
+  <p:timing>
+    <p:tnLst>
+      <p:par>
+        <p:cTn id="1" dur="indefinite" restart="never" nodeType="tmRoot"/>
+      </p:par>
+    </p:tnLst>
+  </p:timing>
+</p:sld>
+</file>
+
+<file path=ppt/slides/slide8.xml><?xml version="1.0" encoding="utf-8"?>
+<p:sld xmlns:a="http://schemas.openxmlformats.org/drawingml/2006/main" xmlns:r="http://schemas.openxmlformats.org/officeDocument/2006/relationships" xmlns:p="http://schemas.openxmlformats.org/presentationml/2006/main">
+  <p:cSld>
+    <p:spTree>
+      <p:nvGrpSpPr>
+        <p:cNvPr id="1" name=""/>
+        <p:cNvGrpSpPr/>
+        <p:nvPr/>
+      </p:nvGrpSpPr>
+      <p:grpSpPr>
+        <a:xfrm>
+          <a:off x="0" y="0"/>
+          <a:ext cx="0" cy="0"/>
+          <a:chOff x="0" y="0"/>
+          <a:chExt cx="0" cy="0"/>
+        </a:xfrm>
+      </p:grpSpPr>
+      <p:sp>
+        <p:nvSpPr>
+          <p:cNvPr id="2" name="Title 1"/>
+          <p:cNvSpPr>
+            <a:spLocks noGrp="1"/>
+          </p:cNvSpPr>
+          <p:nvPr>
+            <p:ph type="title"/>
+          </p:nvPr>
+        </p:nvSpPr>
+        <p:spPr/>
+        <p:txBody>
+          <a:bodyPr/>
+          <a:lstStyle/>
+          <a:p>
+            <a:r>
+              <a:rPr lang="en-CA" dirty="0" smtClean="0"/>
+              <a:t>Application Architecture</a:t>
+            </a:r>
+            <a:endParaRPr lang="en-CA" dirty="0"/>
+          </a:p>
+        </p:txBody>
+      </p:sp>
+      <p:sp>
+        <p:nvSpPr>
+          <p:cNvPr id="3" name="Content Placeholder 2"/>
+          <p:cNvSpPr>
+            <a:spLocks noGrp="1"/>
+          </p:cNvSpPr>
+          <p:nvPr>
+            <p:ph idx="1"/>
+          </p:nvPr>
+        </p:nvSpPr>
+        <p:spPr/>
+        <p:txBody>
+          <a:bodyPr/>
+          <a:lstStyle/>
+          <a:p>
+            <a:r>
+              <a:rPr lang="en-CA" dirty="0" smtClean="0"/>
+              <a:t>Uses assignment application, but:</a:t>
+            </a:r>
+          </a:p>
+          <a:p>
+            <a:pPr lvl="1"/>
+            <a:r>
+              <a:rPr lang="en-CA" dirty="0" smtClean="0"/>
+              <a:t>Doesn’t render tri by tri: ray caster takes whole geometry</a:t>
+            </a:r>
+          </a:p>
+          <a:p>
+            <a:pPr lvl="1"/>
+            <a:r>
+              <a:rPr lang="en-CA" dirty="0" err="1" smtClean="0"/>
+              <a:t>Kd,Ka,Ks</a:t>
+            </a:r>
+            <a:r>
+              <a:rPr lang="en-CA" dirty="0" smtClean="0"/>
+              <a:t> per vertex rather than a global</a:t>
+            </a:r>
+          </a:p>
+          <a:p>
+            <a:pPr lvl="1"/>
+            <a:r>
+              <a:rPr lang="en-CA" dirty="0" smtClean="0"/>
+              <a:t>Vertex property for determining surface that emits light</a:t>
+            </a:r>
+          </a:p>
+        </p:txBody>
+      </p:sp>
+    </p:spTree>
+    <p:extLst>
+      <p:ext uri="{BB962C8B-B14F-4D97-AF65-F5344CB8AC3E}">
+        <p14:creationId xmlns:p14="http://schemas.microsoft.com/office/powerpoint/2010/main" val="2201788523"/>
+      </p:ext>
+    </p:extLst>
+  </p:cSld>
+  <p:clrMapOvr>
+    <a:masterClrMapping/>
+  </p:clrMapOvr>
+  <p:timing>
+    <p:tnLst>
+      <p:par>
+        <p:cTn id="1" dur="indefinite" restart="never" nodeType="tmRoot"/>
+      </p:par>
+    </p:tnLst>
+  </p:timing>
+</p:sld>
+</file>
+
+<file path=ppt/slides/slide9.xml><?xml version="1.0" encoding="utf-8"?>
+<p:sld xmlns:a="http://schemas.openxmlformats.org/drawingml/2006/main" xmlns:r="http://schemas.openxmlformats.org/officeDocument/2006/relationships" xmlns:p="http://schemas.openxmlformats.org/presentationml/2006/main">
+  <p:cSld>
+    <p:spTree>
+      <p:nvGrpSpPr>
+        <p:cNvPr id="1" name=""/>
+        <p:cNvGrpSpPr/>
+        <p:nvPr/>
+      </p:nvGrpSpPr>
+      <p:grpSpPr>
+        <a:xfrm>
+          <a:off x="0" y="0"/>
+          <a:ext cx="0" cy="0"/>
+          <a:chOff x="0" y="0"/>
+          <a:chExt cx="0" cy="0"/>
+        </a:xfrm>
+      </p:grpSpPr>
+      <p:sp>
+        <p:nvSpPr>
+          <p:cNvPr id="2" name="Title 1"/>
+          <p:cNvSpPr>
+            <a:spLocks noGrp="1"/>
+          </p:cNvSpPr>
+          <p:nvPr>
+            <p:ph type="title"/>
+          </p:nvPr>
+        </p:nvSpPr>
+        <p:spPr/>
+        <p:txBody>
+          <a:bodyPr/>
+          <a:lstStyle/>
+          <a:p>
+            <a:r>
+              <a:rPr lang="en-CA" dirty="0" smtClean="0"/>
+              <a:t>Results (</a:t>
+            </a:r>
+            <a:r>
+              <a:rPr lang="en-CA" dirty="0" err="1" smtClean="0"/>
+              <a:t>s</a:t>
+            </a:r>
+            <a:r>
+              <a:rPr lang="en-CA" dirty="0" err="1" smtClean="0">
+                <a:sym typeface="Wingdings" panose="05000000000000000000" pitchFamily="2" charset="2"/>
+              </a:rPr>
+              <a:t>samples</a:t>
+            </a:r>
+            <a:r>
+              <a:rPr lang="en-CA" dirty="0" smtClean="0">
+                <a:sym typeface="Wingdings" panose="05000000000000000000" pitchFamily="2" charset="2"/>
+              </a:rPr>
+              <a:t>, </a:t>
+            </a:r>
+            <a:r>
+              <a:rPr lang="en-CA" dirty="0" err="1" smtClean="0">
+                <a:sym typeface="Wingdings" panose="05000000000000000000" pitchFamily="2" charset="2"/>
+              </a:rPr>
+              <a:t>ddepth</a:t>
+            </a:r>
+            <a:r>
+              <a:rPr lang="en-CA" dirty="0" smtClean="0">
+                <a:sym typeface="Wingdings" panose="05000000000000000000" pitchFamily="2" charset="2"/>
+              </a:rPr>
+              <a:t>)</a:t>
+            </a:r>
+            <a:endParaRPr lang="en-CA" dirty="0"/>
+          </a:p>
+        </p:txBody>
+      </p:sp>
+      <p:pic>
+        <p:nvPicPr>
+          <p:cNvPr id="4" name="Content Placeholder 3"/>
+          <p:cNvPicPr>
+            <a:picLocks noGrp="1" noChangeAspect="1"/>
+          </p:cNvPicPr>
+          <p:nvPr>
+            <p:ph idx="1"/>
+          </p:nvPr>
+        </p:nvPicPr>
+        <p:blipFill>
+          <a:blip r:embed="rId2">
+            <a:extLst>
+              <a:ext uri="{28A0092B-C50C-407E-A947-70E740481C1C}">
+                <a14:useLocalDpi xmlns:a14="http://schemas.microsoft.com/office/drawing/2010/main" val="0"/>
+              </a:ext>
+            </a:extLst>
+          </a:blip>
+          <a:stretch>
+            <a:fillRect/>
+          </a:stretch>
+        </p:blipFill>
+        <p:spPr>
+          <a:xfrm>
+            <a:off x="646111" y="1853248"/>
+            <a:ext cx="3250794" cy="3250794"/>
+          </a:xfrm>
+        </p:spPr>
+      </p:pic>
+      <p:pic>
+        <p:nvPicPr>
+          <p:cNvPr id="5" name="Picture 4"/>
+          <p:cNvPicPr>
+            <a:picLocks noChangeAspect="1"/>
+          </p:cNvPicPr>
+          <p:nvPr/>
+        </p:nvPicPr>
+        <p:blipFill>
+          <a:blip r:embed="rId3">
+            <a:extLst>
+              <a:ext uri="{28A0092B-C50C-407E-A947-70E740481C1C}">
+                <a14:useLocalDpi xmlns:a14="http://schemas.microsoft.com/office/drawing/2010/main" val="0"/>
+              </a:ext>
+            </a:extLst>
+          </a:blip>
+          <a:stretch>
+            <a:fillRect/>
+          </a:stretch>
+        </p:blipFill>
+        <p:spPr>
+          <a:xfrm>
+            <a:off x="4564607" y="1853248"/>
+            <a:ext cx="3250794" cy="3250794"/>
+          </a:xfrm>
+          <a:prstGeom prst="rect">
+            <a:avLst/>
+          </a:prstGeom>
+        </p:spPr>
+      </p:pic>
+      <p:pic>
+        <p:nvPicPr>
+          <p:cNvPr id="6" name="Picture 5"/>
+          <p:cNvPicPr>
+            <a:picLocks noChangeAspect="1"/>
+          </p:cNvPicPr>
+          <p:nvPr/>
+        </p:nvPicPr>
+        <p:blipFill>
+          <a:blip r:embed="rId4">
+            <a:extLst>
+              <a:ext uri="{28A0092B-C50C-407E-A947-70E740481C1C}">
+                <a14:useLocalDpi xmlns:a14="http://schemas.microsoft.com/office/drawing/2010/main" val="0"/>
+              </a:ext>
+            </a:extLst>
+          </a:blip>
+          <a:stretch>
+            <a:fillRect/>
+          </a:stretch>
+        </p:blipFill>
+        <p:spPr>
+          <a:xfrm>
+            <a:off x="8341848" y="1853248"/>
+            <a:ext cx="3250794" cy="3250794"/>
+          </a:xfrm>
+          <a:prstGeom prst="rect">
+            <a:avLst/>
+          </a:prstGeom>
+        </p:spPr>
+      </p:pic>
+      <p:sp>
+        <p:nvSpPr>
+          <p:cNvPr id="7" name="TextBox 6"/>
+          <p:cNvSpPr txBox="1"/>
+          <p:nvPr/>
+        </p:nvSpPr>
+        <p:spPr>
+          <a:xfrm>
+            <a:off x="646111" y="5104042"/>
+            <a:ext cx="3250793" cy="369332"/>
+          </a:xfrm>
+          <a:prstGeom prst="rect">
+            <a:avLst/>
+          </a:prstGeom>
+          <a:noFill/>
+        </p:spPr>
+        <p:txBody>
+          <a:bodyPr wrap="square" rtlCol="0">
+            <a:spAutoFit/>
+          </a:bodyPr>
+          <a:lstStyle/>
+          <a:p>
+            <a:pPr algn="ctr"/>
+            <a:r>
+              <a:rPr lang="en-CA" dirty="0" smtClean="0"/>
+              <a:t>1S, 1D, 26s</a:t>
+            </a:r>
+            <a:endParaRPr lang="en-CA" dirty="0"/>
+          </a:p>
+        </p:txBody>
+      </p:sp>
+      <p:sp>
+        <p:nvSpPr>
+          <p:cNvPr id="8" name="TextBox 7"/>
+          <p:cNvSpPr txBox="1"/>
+          <p:nvPr/>
+        </p:nvSpPr>
+        <p:spPr>
+          <a:xfrm>
+            <a:off x="4564607" y="5104042"/>
+            <a:ext cx="3250793" cy="369332"/>
+          </a:xfrm>
+          <a:prstGeom prst="rect">
+            <a:avLst/>
+          </a:prstGeom>
+          <a:noFill/>
+        </p:spPr>
+        <p:txBody>
+          <a:bodyPr wrap="square" rtlCol="0">
+            <a:spAutoFit/>
+          </a:bodyPr>
+          <a:lstStyle/>
+          <a:p>
+            <a:pPr algn="ctr"/>
+            <a:r>
+              <a:rPr lang="en-CA" dirty="0" smtClean="0"/>
+              <a:t>1S, 4D, 34s</a:t>
+            </a:r>
+            <a:endParaRPr lang="en-CA" dirty="0"/>
+          </a:p>
+        </p:txBody>
+      </p:sp>
+      <p:sp>
+        <p:nvSpPr>
+          <p:cNvPr id="9" name="TextBox 8"/>
+          <p:cNvSpPr txBox="1"/>
+          <p:nvPr/>
+        </p:nvSpPr>
+        <p:spPr>
+          <a:xfrm>
+            <a:off x="8341848" y="5125199"/>
+            <a:ext cx="3250793" cy="369332"/>
+          </a:xfrm>
+          <a:prstGeom prst="rect">
+            <a:avLst/>
+          </a:prstGeom>
+          <a:noFill/>
+        </p:spPr>
+        <p:txBody>
+          <a:bodyPr wrap="square" rtlCol="0">
+            <a:spAutoFit/>
+          </a:bodyPr>
+          <a:lstStyle/>
+          <a:p>
+            <a:pPr algn="ctr"/>
+            <a:r>
+              <a:rPr lang="en-CA" dirty="0" smtClean="0"/>
+              <a:t>1S, 16D, 36s</a:t>
+            </a:r>
+            <a:endParaRPr lang="en-CA" dirty="0"/>
+          </a:p>
+        </p:txBody>
+      </p:sp>
+    </p:spTree>
+    <p:extLst>
+      <p:ext uri="{BB962C8B-B14F-4D97-AF65-F5344CB8AC3E}">
+        <p14:creationId xmlns:p14="http://schemas.microsoft.com/office/powerpoint/2010/main" val="336694979"/>
+      </p:ext>
+    </p:extLst>
+  </p:cSld>
+  <p:clrMapOvr>
+    <a:masterClrMapping/>
+  </p:clrMapOvr>
+  <p:timing>
+    <p:tnLst>
+      <p:par>
+        <p:cTn id="1" dur="indefinite" restart="never" nodeType="tmRoot"/>
+      </p:par>
+    </p:tnLst>
+  </p:timing>
 </p:sld>
 </file>
 

</xml_diff>